<commit_message>
fazi - hoosh jozve
</commit_message>
<xml_diff>
--- a/پیشرفته/lstm/lstm2.pptx
+++ b/پیشرفته/lstm/lstm2.pptx
@@ -157,6 +157,12 @@
         </p14:section>
       </p14:sectionLst>
     </p:ext>
+    <p:ext uri="{EFAFB233-063F-42B5-8137-9DF3F51BA10A}">
+      <p15:sldGuideLst xmlns:p15="http://schemas.microsoft.com/office/powerpoint/2012/main"/>
+    </p:ext>
+    <p:ext uri="{2D200454-40CA-4A62-9FC3-DE9A4176ACB9}">
+      <p15:notesGuideLst xmlns:p15="http://schemas.microsoft.com/office/powerpoint/2012/main"/>
+    </p:ext>
   </p:extLst>
 </p:presentation>
 </file>
@@ -243,7 +249,7 @@
           <a:p>
             <a:fld id="{19B7F426-1164-44F8-9E8E-2A27A293764C}" type="datetimeFigureOut">
               <a:rPr lang="en-US" smtClean="0"/>
-              <a:t>2023-12-08</a:t>
+              <a:t>2024-01-12</a:t>
             </a:fld>
             <a:endParaRPr lang="en-US"/>
           </a:p>
@@ -701,7 +707,7 @@
           <a:p>
             <a:fld id="{BF4B6DCE-74A5-4975-B4B8-B66AACBB1915}" type="datetimeFigureOut">
               <a:rPr lang="en-US" smtClean="0"/>
-              <a:t>2023-12-08</a:t>
+              <a:t>2024-01-12</a:t>
             </a:fld>
             <a:endParaRPr lang="en-US"/>
           </a:p>
@@ -1137,7 +1143,7 @@
           <a:p>
             <a:fld id="{BF4B6DCE-74A5-4975-B4B8-B66AACBB1915}" type="datetimeFigureOut">
               <a:rPr lang="en-US" smtClean="0"/>
-              <a:t>2023-12-08</a:t>
+              <a:t>2024-01-12</a:t>
             </a:fld>
             <a:endParaRPr lang="en-US"/>
           </a:p>
@@ -1387,7 +1393,7 @@
           <a:p>
             <a:fld id="{BF4B6DCE-74A5-4975-B4B8-B66AACBB1915}" type="datetimeFigureOut">
               <a:rPr lang="en-US" smtClean="0"/>
-              <a:t>2023-12-08</a:t>
+              <a:t>2024-01-12</a:t>
             </a:fld>
             <a:endParaRPr lang="en-US"/>
           </a:p>
@@ -1695,7 +1701,7 @@
           <a:p>
             <a:fld id="{BF4B6DCE-74A5-4975-B4B8-B66AACBB1915}" type="datetimeFigureOut">
               <a:rPr lang="en-US" smtClean="0"/>
-              <a:t>2023-12-08</a:t>
+              <a:t>2024-01-12</a:t>
             </a:fld>
             <a:endParaRPr lang="en-US"/>
           </a:p>
@@ -2013,7 +2019,7 @@
           <a:p>
             <a:fld id="{BF4B6DCE-74A5-4975-B4B8-B66AACBB1915}" type="datetimeFigureOut">
               <a:rPr lang="en-US" smtClean="0"/>
-              <a:t>2023-12-08</a:t>
+              <a:t>2024-01-12</a:t>
             </a:fld>
             <a:endParaRPr lang="en-US"/>
           </a:p>
@@ -2315,7 +2321,7 @@
           <a:p>
             <a:fld id="{BF4B6DCE-74A5-4975-B4B8-B66AACBB1915}" type="datetimeFigureOut">
               <a:rPr lang="en-US" smtClean="0"/>
-              <a:t>2023-12-08</a:t>
+              <a:t>2024-01-12</a:t>
             </a:fld>
             <a:endParaRPr lang="en-US"/>
           </a:p>
@@ -2682,7 +2688,7 @@
           <a:p>
             <a:fld id="{BF4B6DCE-74A5-4975-B4B8-B66AACBB1915}" type="datetimeFigureOut">
               <a:rPr lang="en-US" smtClean="0"/>
-              <a:t>2023-12-08</a:t>
+              <a:t>2024-01-12</a:t>
             </a:fld>
             <a:endParaRPr lang="en-US"/>
           </a:p>
@@ -2856,7 +2862,7 @@
           <a:p>
             <a:fld id="{BF4B6DCE-74A5-4975-B4B8-B66AACBB1915}" type="datetimeFigureOut">
               <a:rPr lang="en-US" smtClean="0"/>
-              <a:t>2023-12-08</a:t>
+              <a:t>2024-01-12</a:t>
             </a:fld>
             <a:endParaRPr lang="en-US"/>
           </a:p>
@@ -3036,7 +3042,7 @@
           <a:p>
             <a:fld id="{BF4B6DCE-74A5-4975-B4B8-B66AACBB1915}" type="datetimeFigureOut">
               <a:rPr lang="en-US" smtClean="0"/>
-              <a:t>2023-12-08</a:t>
+              <a:t>2024-01-12</a:t>
             </a:fld>
             <a:endParaRPr lang="en-US"/>
           </a:p>
@@ -3206,7 +3212,7 @@
           <a:p>
             <a:fld id="{BF4B6DCE-74A5-4975-B4B8-B66AACBB1915}" type="datetimeFigureOut">
               <a:rPr lang="en-US" smtClean="0"/>
-              <a:t>2023-12-08</a:t>
+              <a:t>2024-01-12</a:t>
             </a:fld>
             <a:endParaRPr lang="en-US"/>
           </a:p>
@@ -3456,7 +3462,7 @@
           <a:p>
             <a:fld id="{BF4B6DCE-74A5-4975-B4B8-B66AACBB1915}" type="datetimeFigureOut">
               <a:rPr lang="en-US" smtClean="0"/>
-              <a:t>2023-12-08</a:t>
+              <a:t>2024-01-12</a:t>
             </a:fld>
             <a:endParaRPr lang="en-US"/>
           </a:p>
@@ -3692,7 +3698,7 @@
           <a:p>
             <a:fld id="{BF4B6DCE-74A5-4975-B4B8-B66AACBB1915}" type="datetimeFigureOut">
               <a:rPr lang="en-US" smtClean="0"/>
-              <a:t>2023-12-08</a:t>
+              <a:t>2024-01-12</a:t>
             </a:fld>
             <a:endParaRPr lang="en-US"/>
           </a:p>
@@ -4074,7 +4080,7 @@
           <a:p>
             <a:fld id="{BF4B6DCE-74A5-4975-B4B8-B66AACBB1915}" type="datetimeFigureOut">
               <a:rPr lang="en-US" smtClean="0"/>
-              <a:t>2023-12-08</a:t>
+              <a:t>2024-01-12</a:t>
             </a:fld>
             <a:endParaRPr lang="en-US"/>
           </a:p>
@@ -4192,7 +4198,7 @@
           <a:p>
             <a:fld id="{BF4B6DCE-74A5-4975-B4B8-B66AACBB1915}" type="datetimeFigureOut">
               <a:rPr lang="en-US" smtClean="0"/>
-              <a:t>2023-12-08</a:t>
+              <a:t>2024-01-12</a:t>
             </a:fld>
             <a:endParaRPr lang="en-US"/>
           </a:p>
@@ -4287,7 +4293,7 @@
           <a:p>
             <a:fld id="{BF4B6DCE-74A5-4975-B4B8-B66AACBB1915}" type="datetimeFigureOut">
               <a:rPr lang="en-US" smtClean="0"/>
-              <a:t>2023-12-08</a:t>
+              <a:t>2024-01-12</a:t>
             </a:fld>
             <a:endParaRPr lang="en-US"/>
           </a:p>
@@ -4542,7 +4548,7 @@
           <a:p>
             <a:fld id="{BF4B6DCE-74A5-4975-B4B8-B66AACBB1915}" type="datetimeFigureOut">
               <a:rPr lang="en-US" smtClean="0"/>
-              <a:t>2023-12-08</a:t>
+              <a:t>2024-01-12</a:t>
             </a:fld>
             <a:endParaRPr lang="en-US"/>
           </a:p>
@@ -4825,7 +4831,7 @@
           <a:p>
             <a:fld id="{BF4B6DCE-74A5-4975-B4B8-B66AACBB1915}" type="datetimeFigureOut">
               <a:rPr lang="en-US" smtClean="0"/>
-              <a:t>2023-12-08</a:t>
+              <a:t>2024-01-12</a:t>
             </a:fld>
             <a:endParaRPr lang="en-US"/>
           </a:p>
@@ -5231,7 +5237,7 @@
           <a:p>
             <a:fld id="{BF4B6DCE-74A5-4975-B4B8-B66AACBB1915}" type="datetimeFigureOut">
               <a:rPr lang="en-US" smtClean="0"/>
-              <a:t>2023-12-08</a:t>
+              <a:t>2024-01-12</a:t>
             </a:fld>
             <a:endParaRPr lang="en-US"/>
           </a:p>
@@ -5972,7 +5978,7 @@
         </p:nvSpPr>
         <p:spPr>
           <a:xfrm>
-            <a:off x="827647" y="1815353"/>
+            <a:off x="1629752" y="676364"/>
             <a:ext cx="8534400" cy="3615267"/>
           </a:xfrm>
         </p:spPr>
@@ -6050,6 +6056,42 @@
           </a:p>
         </p:txBody>
       </p:sp>
+      <p:pic>
+        <p:nvPicPr>
+          <p:cNvPr id="4" name="Picture 3">
+            <a:extLst>
+              <a:ext uri="{FF2B5EF4-FFF2-40B4-BE49-F238E27FC236}">
+                <a16:creationId xmlns:a16="http://schemas.microsoft.com/office/drawing/2014/main" id="{35D97995-9CB5-B316-367C-BF2A003972C1}"/>
+              </a:ext>
+            </a:extLst>
+          </p:cNvPr>
+          <p:cNvPicPr>
+            <a:picLocks noChangeAspect="1"/>
+          </p:cNvPicPr>
+          <p:nvPr/>
+        </p:nvPicPr>
+        <p:blipFill>
+          <a:blip r:embed="rId2">
+            <a:extLst>
+              <a:ext uri="{28A0092B-C50C-407E-A947-70E740481C1C}">
+                <a14:useLocalDpi xmlns:a14="http://schemas.microsoft.com/office/drawing/2010/main" val="0"/>
+              </a:ext>
+            </a:extLst>
+          </a:blip>
+          <a:stretch>
+            <a:fillRect/>
+          </a:stretch>
+        </p:blipFill>
+        <p:spPr>
+          <a:xfrm>
+            <a:off x="3272002" y="3701716"/>
+            <a:ext cx="5249900" cy="2734675"/>
+          </a:xfrm>
+          <a:prstGeom prst="rect">
+            <a:avLst/>
+          </a:prstGeom>
+        </p:spPr>
+      </p:pic>
     </p:spTree>
     <p:extLst>
       <p:ext uri="{BB962C8B-B14F-4D97-AF65-F5344CB8AC3E}">
@@ -6667,6 +6709,42 @@
           </a:p>
         </p:txBody>
       </p:sp>
+      <p:pic>
+        <p:nvPicPr>
+          <p:cNvPr id="4" name="Picture 3">
+            <a:extLst>
+              <a:ext uri="{FF2B5EF4-FFF2-40B4-BE49-F238E27FC236}">
+                <a16:creationId xmlns:a16="http://schemas.microsoft.com/office/drawing/2014/main" id="{8FF45B74-B19D-43B0-6F4E-AA18DA7FFD75}"/>
+              </a:ext>
+            </a:extLst>
+          </p:cNvPr>
+          <p:cNvPicPr>
+            <a:picLocks noChangeAspect="1"/>
+          </p:cNvPicPr>
+          <p:nvPr/>
+        </p:nvPicPr>
+        <p:blipFill>
+          <a:blip r:embed="rId2">
+            <a:extLst>
+              <a:ext uri="{28A0092B-C50C-407E-A947-70E740481C1C}">
+                <a14:useLocalDpi xmlns:a14="http://schemas.microsoft.com/office/drawing/2010/main" val="0"/>
+              </a:ext>
+            </a:extLst>
+          </a:blip>
+          <a:stretch>
+            <a:fillRect/>
+          </a:stretch>
+        </p:blipFill>
+        <p:spPr>
+          <a:xfrm>
+            <a:off x="3526099" y="2985637"/>
+            <a:ext cx="4499106" cy="3475780"/>
+          </a:xfrm>
+          <a:prstGeom prst="rect">
+            <a:avLst/>
+          </a:prstGeom>
+        </p:spPr>
+      </p:pic>
     </p:spTree>
     <p:extLst>
       <p:ext uri="{BB962C8B-B14F-4D97-AF65-F5344CB8AC3E}">
@@ -7079,8 +7157,8 @@
         </p:nvSpPr>
         <p:spPr>
           <a:xfrm>
-            <a:off x="997977" y="1219201"/>
-            <a:ext cx="8534400" cy="4265208"/>
+            <a:off x="802105" y="224590"/>
+            <a:ext cx="10206146" cy="4265208"/>
           </a:xfrm>
         </p:spPr>
         <p:txBody>
@@ -7203,29 +7281,6 @@
             </a:endParaRPr>
           </a:p>
           <a:p>
-            <a:pPr marL="0" marR="0" indent="0" algn="r" rtl="1">
-              <a:lnSpc>
-                <a:spcPct val="107000"/>
-              </a:lnSpc>
-              <a:spcBef>
-                <a:spcPts val="0"/>
-              </a:spcBef>
-              <a:spcAft>
-                <a:spcPts val="800"/>
-              </a:spcAft>
-              <a:buNone/>
-            </a:pPr>
-            <a:endParaRPr lang="en-US" dirty="0">
-              <a:solidFill>
-                <a:schemeClr val="bg1"/>
-              </a:solidFill>
-              <a:effectLst/>
-              <a:latin typeface="Calibri" panose="020F0502020204030204" pitchFamily="34" charset="0"/>
-              <a:ea typeface="Calibri" panose="020F0502020204030204" pitchFamily="34" charset="0"/>
-              <a:cs typeface="B Nazanin" panose="00000400000000000000" pitchFamily="2" charset="-78"/>
-            </a:endParaRPr>
-          </a:p>
-          <a:p>
             <a:pPr marL="0" marR="0" algn="r" rtl="1">
               <a:lnSpc>
                 <a:spcPct val="107000"/>
@@ -7269,6 +7324,42 @@
           </a:p>
         </p:txBody>
       </p:sp>
+      <p:pic>
+        <p:nvPicPr>
+          <p:cNvPr id="2" name="Picture 1">
+            <a:extLst>
+              <a:ext uri="{FF2B5EF4-FFF2-40B4-BE49-F238E27FC236}">
+                <a16:creationId xmlns:a16="http://schemas.microsoft.com/office/drawing/2014/main" id="{8DC9DD6C-A23D-6DEC-DAFA-A15B17C705C6}"/>
+              </a:ext>
+            </a:extLst>
+          </p:cNvPr>
+          <p:cNvPicPr>
+            <a:picLocks noChangeAspect="1"/>
+          </p:cNvPicPr>
+          <p:nvPr/>
+        </p:nvPicPr>
+        <p:blipFill>
+          <a:blip r:embed="rId2">
+            <a:extLst>
+              <a:ext uri="{28A0092B-C50C-407E-A947-70E740481C1C}">
+                <a14:useLocalDpi xmlns:a14="http://schemas.microsoft.com/office/drawing/2010/main" val="0"/>
+              </a:ext>
+            </a:extLst>
+          </a:blip>
+          <a:stretch>
+            <a:fillRect/>
+          </a:stretch>
+        </p:blipFill>
+        <p:spPr>
+          <a:xfrm>
+            <a:off x="1567506" y="4295272"/>
+            <a:ext cx="5334374" cy="2207441"/>
+          </a:xfrm>
+          <a:prstGeom prst="rect">
+            <a:avLst/>
+          </a:prstGeom>
+        </p:spPr>
+      </p:pic>
     </p:spTree>
     <p:extLst>
       <p:ext uri="{BB962C8B-B14F-4D97-AF65-F5344CB8AC3E}">
@@ -7588,7 +7679,7 @@
         </p:nvSpPr>
         <p:spPr>
           <a:xfrm>
-            <a:off x="917294" y="863601"/>
+            <a:off x="1607104" y="61496"/>
             <a:ext cx="8534400" cy="3615267"/>
           </a:xfrm>
         </p:spPr>
@@ -7626,6 +7717,42 @@
           </a:p>
         </p:txBody>
       </p:sp>
+      <p:pic>
+        <p:nvPicPr>
+          <p:cNvPr id="4" name="Picture 3">
+            <a:extLst>
+              <a:ext uri="{FF2B5EF4-FFF2-40B4-BE49-F238E27FC236}">
+                <a16:creationId xmlns:a16="http://schemas.microsoft.com/office/drawing/2014/main" id="{1D1C8EE0-B579-D0A2-6C3A-A1D4F67A14E8}"/>
+              </a:ext>
+            </a:extLst>
+          </p:cNvPr>
+          <p:cNvPicPr>
+            <a:picLocks noChangeAspect="1"/>
+          </p:cNvPicPr>
+          <p:nvPr/>
+        </p:nvPicPr>
+        <p:blipFill>
+          <a:blip r:embed="rId2">
+            <a:extLst>
+              <a:ext uri="{28A0092B-C50C-407E-A947-70E740481C1C}">
+                <a14:useLocalDpi xmlns:a14="http://schemas.microsoft.com/office/drawing/2010/main" val="0"/>
+              </a:ext>
+            </a:extLst>
+          </a:blip>
+          <a:stretch>
+            <a:fillRect/>
+          </a:stretch>
+        </p:blipFill>
+        <p:spPr>
+          <a:xfrm>
+            <a:off x="2074862" y="2881592"/>
+            <a:ext cx="7143750" cy="3676650"/>
+          </a:xfrm>
+          <a:prstGeom prst="rect">
+            <a:avLst/>
+          </a:prstGeom>
+        </p:spPr>
+      </p:pic>
     </p:spTree>
     <p:extLst>
       <p:ext uri="{BB962C8B-B14F-4D97-AF65-F5344CB8AC3E}">
@@ -35009,7 +35136,7 @@
         </p:nvSpPr>
         <p:spPr>
           <a:xfrm>
-            <a:off x="684212" y="1026459"/>
+            <a:off x="1585407" y="144143"/>
             <a:ext cx="8534400" cy="3615267"/>
           </a:xfrm>
         </p:spPr>
@@ -35164,6 +35291,42 @@
           </a:p>
         </p:txBody>
       </p:sp>
+      <p:pic>
+        <p:nvPicPr>
+          <p:cNvPr id="4" name="Picture 3">
+            <a:extLst>
+              <a:ext uri="{FF2B5EF4-FFF2-40B4-BE49-F238E27FC236}">
+                <a16:creationId xmlns:a16="http://schemas.microsoft.com/office/drawing/2014/main" id="{3A3F5AAF-12F1-5850-98F9-37D967BEE736}"/>
+              </a:ext>
+            </a:extLst>
+          </p:cNvPr>
+          <p:cNvPicPr>
+            <a:picLocks noChangeAspect="1"/>
+          </p:cNvPicPr>
+          <p:nvPr/>
+        </p:nvPicPr>
+        <p:blipFill>
+          <a:blip r:embed="rId2">
+            <a:extLst>
+              <a:ext uri="{28A0092B-C50C-407E-A947-70E740481C1C}">
+                <a14:useLocalDpi xmlns:a14="http://schemas.microsoft.com/office/drawing/2010/main" val="0"/>
+              </a:ext>
+            </a:extLst>
+          </a:blip>
+          <a:stretch>
+            <a:fillRect/>
+          </a:stretch>
+        </p:blipFill>
+        <p:spPr>
+          <a:xfrm>
+            <a:off x="1768435" y="3344332"/>
+            <a:ext cx="5820523" cy="2962368"/>
+          </a:xfrm>
+          <a:prstGeom prst="rect">
+            <a:avLst/>
+          </a:prstGeom>
+        </p:spPr>
+      </p:pic>
     </p:spTree>
     <p:extLst>
       <p:ext uri="{BB962C8B-B14F-4D97-AF65-F5344CB8AC3E}">
@@ -35463,8 +35626,8 @@
         </p:nvSpPr>
         <p:spPr>
           <a:xfrm>
-            <a:off x="800753" y="1062318"/>
-            <a:ext cx="8534400" cy="3615267"/>
+            <a:off x="800753" y="0"/>
+            <a:ext cx="10707035" cy="4276532"/>
           </a:xfrm>
         </p:spPr>
         <p:txBody>
@@ -35543,6 +35706,42 @@
           </a:p>
         </p:txBody>
       </p:sp>
+      <p:pic>
+        <p:nvPicPr>
+          <p:cNvPr id="4" name="Picture 3">
+            <a:extLst>
+              <a:ext uri="{FF2B5EF4-FFF2-40B4-BE49-F238E27FC236}">
+                <a16:creationId xmlns:a16="http://schemas.microsoft.com/office/drawing/2014/main" id="{FBB4F378-DFFB-DF41-D52F-0868D5961EE0}"/>
+              </a:ext>
+            </a:extLst>
+          </p:cNvPr>
+          <p:cNvPicPr>
+            <a:picLocks noChangeAspect="1"/>
+          </p:cNvPicPr>
+          <p:nvPr/>
+        </p:nvPicPr>
+        <p:blipFill>
+          <a:blip r:embed="rId2">
+            <a:extLst>
+              <a:ext uri="{28A0092B-C50C-407E-A947-70E740481C1C}">
+                <a14:useLocalDpi xmlns:a14="http://schemas.microsoft.com/office/drawing/2010/main" val="0"/>
+              </a:ext>
+            </a:extLst>
+          </a:blip>
+          <a:stretch>
+            <a:fillRect/>
+          </a:stretch>
+        </p:blipFill>
+        <p:spPr>
+          <a:xfrm>
+            <a:off x="2571078" y="3305139"/>
+            <a:ext cx="6056555" cy="3276616"/>
+          </a:xfrm>
+          <a:prstGeom prst="rect">
+            <a:avLst/>
+          </a:prstGeom>
+        </p:spPr>
+      </p:pic>
     </p:spTree>
     <p:extLst>
       <p:ext uri="{BB962C8B-B14F-4D97-AF65-F5344CB8AC3E}">

</xml_diff>